<commit_message>
Final version: Modefy PPT
</commit_message>
<xml_diff>
--- a/doc/Crashcrawler_SYSU.pptx
+++ b/doc/Crashcrawler_SYSU.pptx
@@ -8294,7 +8294,7 @@
           </a:ln>
           <a:extLst>
             <a:ext uri="{C572A759-6A51-4108-AA02-DFA0A04FC94B}">
-              <ma14:wrappingTextBoxFlag xmlns="" xmlns:m="http://schemas.openxmlformats.org/officeDocument/2006/math" xmlns:a14="http://schemas.microsoft.com/office/drawing/2010/main" xmlns:ma14="http://schemas.microsoft.com/office/mac/drawingml/2011/main" val="1"/>
+              <ma14:wrappingTextBoxFlag xmlns:ma14="http://schemas.microsoft.com/office/mac/drawingml/2011/main" xmlns:a14="http://schemas.microsoft.com/office/drawing/2010/main" xmlns:m="http://schemas.openxmlformats.org/officeDocument/2006/math" xmlns="" val="1"/>
             </a:ext>
           </a:extLst>
         </p:spPr>
@@ -8999,7 +8999,7 @@
               </a:ln>
               <a:extLst>
                 <a:ext uri="{C572A759-6A51-4108-AA02-DFA0A04FC94B}">
-                  <ma14:wrappingTextBoxFlag xmlns="" xmlns:m="http://schemas.openxmlformats.org/officeDocument/2006/math" xmlns:ma14="http://schemas.microsoft.com/office/mac/drawingml/2011/main" val="1"/>
+                  <ma14:wrappingTextBoxFlag xmlns:ma14="http://schemas.microsoft.com/office/mac/drawingml/2011/main" xmlns:m="http://schemas.openxmlformats.org/officeDocument/2006/math" xmlns="" val="1"/>
                 </a:ext>
               </a:extLst>
             </p:spPr>
@@ -10019,7 +10019,7 @@
         <p:spPr>
           <a:xfrm>
             <a:off x="610448" y="1765148"/>
-            <a:ext cx="10824366" cy="4188326"/>
+            <a:ext cx="10824366" cy="3829253"/>
           </a:xfrm>
           <a:prstGeom prst="rect">
             <a:avLst/>
@@ -10029,7 +10029,7 @@
           </a:ln>
           <a:extLst>
             <a:ext uri="{C572A759-6A51-4108-AA02-DFA0A04FC94B}">
-              <ma14:wrappingTextBoxFlag xmlns="" xmlns:m="http://schemas.openxmlformats.org/officeDocument/2006/math" xmlns:a14="http://schemas.microsoft.com/office/drawing/2010/main" xmlns:ma14="http://schemas.microsoft.com/office/mac/drawingml/2011/main" val="1"/>
+              <ma14:wrappingTextBoxFlag xmlns:ma14="http://schemas.microsoft.com/office/mac/drawingml/2011/main" xmlns:a14="http://schemas.microsoft.com/office/drawing/2010/main" xmlns:m="http://schemas.openxmlformats.org/officeDocument/2006/math" xmlns="" val="1"/>
             </a:ext>
           </a:extLst>
         </p:spPr>
@@ -10113,20 +10113,6 @@
               <a:rPr lang="zh-CN" altLang="en-US" dirty="0"/>
               <a:t>都代表了该进程地址空间的一段，通过循环读取链表，我们可以从中读出所有映射到进程地址空间中的动态库。</a:t>
             </a:r>
-          </a:p>
-          <a:p>
-            <a:pPr marL="828039" lvl="1" indent="-375919">
-              <a:spcBef>
-                <a:spcPts val="400"/>
-              </a:spcBef>
-              <a:buClr>
-                <a:srgbClr val="181C69"/>
-              </a:buClr>
-              <a:buSzPct val="100000"/>
-              <a:buFontTx/>
-              <a:buChar char="❑"/>
-              <a:defRPr sz="2000"/>
-            </a:pPr>
             <a:endParaRPr lang="en-US" altLang="zh-CN" dirty="0"/>
           </a:p>
           <a:p>
@@ -20540,7 +20526,7 @@
           </a:ln>
           <a:extLst>
             <a:ext uri="{C572A759-6A51-4108-AA02-DFA0A04FC94B}">
-              <ma14:wrappingTextBoxFlag xmlns="" xmlns:m="http://schemas.openxmlformats.org/officeDocument/2006/math" xmlns:ma14="http://schemas.microsoft.com/office/mac/drawingml/2011/main" xmlns:a14="http://schemas.microsoft.com/office/drawing/2010/main" xmlns:mc="http://schemas.openxmlformats.org/markup-compatibility/2006" val="1"/>
+              <ma14:wrappingTextBoxFlag xmlns:mc="http://schemas.openxmlformats.org/markup-compatibility/2006" xmlns:a14="http://schemas.microsoft.com/office/drawing/2010/main" xmlns:ma14="http://schemas.microsoft.com/office/mac/drawingml/2011/main" xmlns:m="http://schemas.openxmlformats.org/officeDocument/2006/math" xmlns="" val="1"/>
             </a:ext>
           </a:extLst>
         </p:spPr>
@@ -25015,7 +25001,7 @@
           </a:ln>
           <a:extLst>
             <a:ext uri="{C572A759-6A51-4108-AA02-DFA0A04FC94B}">
-              <ma14:wrappingTextBoxFlag xmlns="" xmlns:m="http://schemas.openxmlformats.org/officeDocument/2006/math" xmlns:a14="http://schemas.microsoft.com/office/drawing/2010/main" xmlns:ma14="http://schemas.microsoft.com/office/mac/drawingml/2011/main" val="1"/>
+              <ma14:wrappingTextBoxFlag xmlns:ma14="http://schemas.microsoft.com/office/mac/drawingml/2011/main" xmlns:a14="http://schemas.microsoft.com/office/drawing/2010/main" xmlns:m="http://schemas.openxmlformats.org/officeDocument/2006/math" xmlns="" val="1"/>
             </a:ext>
           </a:extLst>
         </p:spPr>
@@ -26129,7 +26115,7 @@
           </a:ln>
           <a:extLst>
             <a:ext uri="{C572A759-6A51-4108-AA02-DFA0A04FC94B}">
-              <ma14:wrappingTextBoxFlag xmlns="" xmlns:m="http://schemas.openxmlformats.org/officeDocument/2006/math" xmlns:a14="http://schemas.microsoft.com/office/drawing/2010/main" xmlns:ma14="http://schemas.microsoft.com/office/mac/drawingml/2011/main" val="1"/>
+              <ma14:wrappingTextBoxFlag xmlns:ma14="http://schemas.microsoft.com/office/mac/drawingml/2011/main" xmlns:a14="http://schemas.microsoft.com/office/drawing/2010/main" xmlns:m="http://schemas.openxmlformats.org/officeDocument/2006/math" xmlns="" val="1"/>
             </a:ext>
           </a:extLst>
         </p:spPr>
@@ -26311,7 +26297,23 @@
             </a:pPr>
             <a:r>
               <a:rPr lang="zh-CN" altLang="en-US" dirty="0"/>
-              <a:t>把崩溃报告用可视化的形式展示出来，如：</a:t>
+              <a:t>把崩溃报告用可视化的形式展示出来，如下页</a:t>
+            </a:r>
+            <a:r>
+              <a:rPr lang="en-US" altLang="zh-CN" dirty="0"/>
+              <a:t>PPT</a:t>
+            </a:r>
+            <a:r>
+              <a:rPr lang="zh-CN" altLang="en-US" dirty="0"/>
+              <a:t>中展示的</a:t>
+            </a:r>
+            <a:r>
+              <a:rPr lang="en-US" altLang="zh-CN" dirty="0"/>
+              <a:t>demo</a:t>
+            </a:r>
+            <a:r>
+              <a:rPr lang="zh-CN" altLang="en-US" dirty="0"/>
+              <a:t>。</a:t>
             </a:r>
             <a:endParaRPr lang="en-US" altLang="zh-CN" dirty="0"/>
           </a:p>
@@ -27779,14 +27781,14 @@
           <p:nvPr>
             <p:extLst>
               <p:ext uri="{D42A27DB-BD31-4B8C-83A1-F6EECF244321}">
-                <p14:modId xmlns:p14="http://schemas.microsoft.com/office/powerpoint/2010/main" val="2766275507"/>
+                <p14:modId xmlns:p14="http://schemas.microsoft.com/office/powerpoint/2010/main" val="1132008372"/>
               </p:ext>
             </p:extLst>
           </p:nvPr>
         </p:nvGraphicFramePr>
         <p:xfrm>
-          <a:off x="1906291" y="1524188"/>
-          <a:ext cx="8214101" cy="5174696"/>
+          <a:off x="1906291" y="1604126"/>
+          <a:ext cx="8214101" cy="4453051"/>
         </p:xfrm>
         <a:graphic>
           <a:graphicData uri="http://schemas.openxmlformats.org/drawingml/2006/table">
@@ -28491,12 +28493,12 @@
                     <a:p>
                       <a:pPr algn="ctr" fontAlgn="ctr"/>
                       <a:r>
-                        <a:rPr lang="zh-CN" altLang="en-US" sz="2400" b="1" u="none" strike="noStrike">
+                        <a:rPr lang="zh-CN" altLang="en-US" sz="2400" b="1" u="none" strike="noStrike" dirty="0">
                           <a:effectLst/>
                         </a:rPr>
                         <a:t>指导老师</a:t>
                       </a:r>
-                      <a:endParaRPr lang="zh-CN" altLang="en-US" sz="2400" b="1" i="0" u="none" strike="noStrike">
+                      <a:endParaRPr lang="zh-CN" altLang="en-US" sz="2400" b="1" i="0" u="none" strike="noStrike" dirty="0">
                         <a:solidFill>
                           <a:srgbClr val="000000"/>
                         </a:solidFill>
@@ -28518,7 +28520,7 @@
                         <a:rPr lang="zh-CN" altLang="en-US" sz="2000" u="none" strike="noStrike" dirty="0">
                           <a:effectLst/>
                         </a:rPr>
-                        <a:t>陈鹏飞</a:t>
+                        <a:t>吉圣杰，陈鹏飞</a:t>
                       </a:r>
                       <a:endParaRPr lang="zh-CN" altLang="en-US" sz="2000" b="0" i="0" u="none" strike="noStrike" dirty="0">
                         <a:solidFill>
@@ -28555,81 +28557,6 @@
                 <a:extLst>
                   <a:ext uri="{0D108BD9-81ED-4DB2-BD59-A6C34878D82A}">
                     <a16:rowId xmlns:a16="http://schemas.microsoft.com/office/drawing/2014/main" val="2519948117"/>
-                  </a:ext>
-                </a:extLst>
-              </a:tr>
-              <a:tr h="721645">
-                <a:tc>
-                  <a:txBody>
-                    <a:bodyPr/>
-                    <a:lstStyle/>
-                    <a:p>
-                      <a:pPr algn="ctr" fontAlgn="ctr"/>
-                      <a:r>
-                        <a:rPr lang="zh-CN" altLang="en-US" sz="2400" b="1" u="none" strike="noStrike" dirty="0">
-                          <a:effectLst/>
-                        </a:rPr>
-                        <a:t>出题老师</a:t>
-                      </a:r>
-                      <a:endParaRPr lang="zh-CN" altLang="en-US" sz="2400" b="1" i="0" u="none" strike="noStrike" dirty="0">
-                        <a:solidFill>
-                          <a:srgbClr val="000000"/>
-                        </a:solidFill>
-                        <a:effectLst/>
-                        <a:latin typeface="等线" panose="02010600030101010101" pitchFamily="2" charset="-122"/>
-                        <a:ea typeface="等线" panose="02010600030101010101" pitchFamily="2" charset="-122"/>
-                      </a:endParaRPr>
-                    </a:p>
-                  </a:txBody>
-                  <a:tcPr marL="4763" marR="4763" marT="4763" marB="0" anchor="ctr"/>
-                </a:tc>
-                <a:tc gridSpan="3">
-                  <a:txBody>
-                    <a:bodyPr/>
-                    <a:lstStyle/>
-                    <a:p>
-                      <a:pPr algn="ctr" fontAlgn="ctr"/>
-                      <a:r>
-                        <a:rPr lang="zh-CN" altLang="en-US" sz="2000" u="none" strike="noStrike" dirty="0">
-                          <a:effectLst/>
-                        </a:rPr>
-                        <a:t>吉圣杰</a:t>
-                      </a:r>
-                      <a:endParaRPr lang="zh-CN" altLang="en-US" sz="2000" b="0" i="0" u="none" strike="noStrike" dirty="0">
-                        <a:solidFill>
-                          <a:srgbClr val="000000"/>
-                        </a:solidFill>
-                        <a:effectLst/>
-                        <a:latin typeface="等线" panose="02010600030101010101" pitchFamily="2" charset="-122"/>
-                        <a:ea typeface="等线" panose="02010600030101010101" pitchFamily="2" charset="-122"/>
-                      </a:endParaRPr>
-                    </a:p>
-                  </a:txBody>
-                  <a:tcPr marL="4763" marR="4763" marT="4763" marB="0" anchor="ctr"/>
-                </a:tc>
-                <a:tc hMerge="1">
-                  <a:txBody>
-                    <a:bodyPr/>
-                    <a:lstStyle/>
-                    <a:p>
-                      <a:endParaRPr lang="zh-CN" altLang="en-US"/>
-                    </a:p>
-                  </a:txBody>
-                  <a:tcPr/>
-                </a:tc>
-                <a:tc hMerge="1">
-                  <a:txBody>
-                    <a:bodyPr/>
-                    <a:lstStyle/>
-                    <a:p>
-                      <a:endParaRPr lang="zh-CN" altLang="en-US"/>
-                    </a:p>
-                  </a:txBody>
-                  <a:tcPr/>
-                </a:tc>
-                <a:extLst>
-                  <a:ext uri="{0D108BD9-81ED-4DB2-BD59-A6C34878D82A}">
-                    <a16:rowId xmlns:a16="http://schemas.microsoft.com/office/drawing/2014/main" val="2542792335"/>
                   </a:ext>
                 </a:extLst>
               </a:tr>
@@ -29050,7 +28977,7 @@
           </a:ln>
           <a:extLst>
             <a:ext uri="{C572A759-6A51-4108-AA02-DFA0A04FC94B}">
-              <ma14:wrappingTextBoxFlag xmlns="" xmlns:m="http://schemas.openxmlformats.org/officeDocument/2006/math" xmlns:a14="http://schemas.microsoft.com/office/drawing/2010/main" xmlns:ma14="http://schemas.microsoft.com/office/mac/drawingml/2011/main" val="1"/>
+              <ma14:wrappingTextBoxFlag xmlns:ma14="http://schemas.microsoft.com/office/mac/drawingml/2011/main" xmlns:a14="http://schemas.microsoft.com/office/drawing/2010/main" xmlns:m="http://schemas.openxmlformats.org/officeDocument/2006/math" xmlns="" val="1"/>
             </a:ext>
           </a:extLst>
         </p:spPr>
@@ -32916,7 +32843,7 @@
           </a:ln>
           <a:extLst>
             <a:ext uri="{C572A759-6A51-4108-AA02-DFA0A04FC94B}">
-              <ma14:wrappingTextBoxFlag xmlns="" xmlns:m="http://schemas.openxmlformats.org/officeDocument/2006/math" xmlns:a14="http://schemas.microsoft.com/office/drawing/2010/main" xmlns:ma14="http://schemas.microsoft.com/office/mac/drawingml/2011/main" val="1"/>
+              <ma14:wrappingTextBoxFlag xmlns:ma14="http://schemas.microsoft.com/office/mac/drawingml/2011/main" xmlns:a14="http://schemas.microsoft.com/office/drawing/2010/main" xmlns:m="http://schemas.openxmlformats.org/officeDocument/2006/math" xmlns="" val="1"/>
             </a:ext>
           </a:extLst>
         </p:spPr>
@@ -34960,7 +34887,7 @@
           </a:ln>
           <a:extLst>
             <a:ext uri="{C572A759-6A51-4108-AA02-DFA0A04FC94B}">
-              <ma14:wrappingTextBoxFlag xmlns="" xmlns:m="http://schemas.openxmlformats.org/officeDocument/2006/math" xmlns:a14="http://schemas.microsoft.com/office/drawing/2010/main" xmlns:ma14="http://schemas.microsoft.com/office/mac/drawingml/2011/main" val="1"/>
+              <ma14:wrappingTextBoxFlag xmlns:ma14="http://schemas.microsoft.com/office/mac/drawingml/2011/main" xmlns:a14="http://schemas.microsoft.com/office/drawing/2010/main" xmlns:m="http://schemas.openxmlformats.org/officeDocument/2006/math" xmlns="" val="1"/>
             </a:ext>
           </a:extLst>
         </p:spPr>
@@ -34990,8 +34917,12 @@
               <a:t>do_exit</a:t>
             </a:r>
             <a:r>
+              <a:rPr lang="en-US" altLang="zh-CN" sz="2400" dirty="0"/>
+              <a:t>()</a:t>
+            </a:r>
+            <a:r>
               <a:rPr lang="zh-CN" altLang="en-US" sz="2400" dirty="0"/>
-              <a:t>（）函数，我们找到了几个可供检测的点：</a:t>
+              <a:t>函数，我们找到了几个可供检测的点：</a:t>
             </a:r>
             <a:endParaRPr lang="en-US" altLang="zh-CN" sz="2800" b="1" dirty="0"/>
           </a:p>
@@ -35100,7 +35031,7 @@
             </a:pPr>
             <a:r>
               <a:rPr lang="en-US" altLang="zh-CN" dirty="0" err="1"/>
-              <a:t>ched_process_exit</a:t>
+              <a:t>do_exit</a:t>
             </a:r>
             <a:r>
               <a:rPr lang="en-US" altLang="zh-CN" dirty="0"/>
@@ -35108,7 +35039,7 @@
             </a:r>
             <a:r>
               <a:rPr lang="en-US" altLang="zh-CN" dirty="0" err="1"/>
-              <a:t>tracepoint</a:t>
+              <a:t>kprobe</a:t>
             </a:r>
             <a:r>
               <a:rPr lang="en-US" altLang="zh-CN" dirty="0"/>
@@ -35852,7 +35783,7 @@
           </a:ln>
           <a:extLst>
             <a:ext uri="{C572A759-6A51-4108-AA02-DFA0A04FC94B}">
-              <ma14:wrappingTextBoxFlag xmlns="" xmlns:m="http://schemas.openxmlformats.org/officeDocument/2006/math" xmlns:a14="http://schemas.microsoft.com/office/drawing/2010/main" xmlns:ma14="http://schemas.microsoft.com/office/mac/drawingml/2011/main" val="1"/>
+              <ma14:wrappingTextBoxFlag xmlns:ma14="http://schemas.microsoft.com/office/mac/drawingml/2011/main" xmlns:a14="http://schemas.microsoft.com/office/drawing/2010/main" xmlns:m="http://schemas.openxmlformats.org/officeDocument/2006/math" xmlns="" val="1"/>
             </a:ext>
           </a:extLst>
         </p:spPr>

</xml_diff>